<commit_message>
Adding presentations up to 6 September.
</commit_message>
<xml_diff>
--- a/Presentations/CMPSC 100 - Fall 2019 - Week 0 - 28 August.pptx
+++ b/Presentations/CMPSC 100 - Fall 2019 - Week 0 - 28 August.pptx
@@ -216,7 +216,7 @@
           <a:p>
             <a:fld id="{1787406F-F45D-4B31-8EC9-9CE5FA7179BC}" type="datetimeFigureOut">
               <a:rPr lang="en-US" smtClean="0"/>
-              <a:t>8/25/2019</a:t>
+              <a:t>8/28/2019</a:t>
             </a:fld>
             <a:endParaRPr lang="en-US"/>
           </a:p>
@@ -778,7 +778,7 @@
           <a:p>
             <a:fld id="{8CEE9158-D55C-48AF-AB8C-3C6514A907FE}" type="datetimeFigureOut">
               <a:rPr lang="en-US" smtClean="0"/>
-              <a:t>8/25/2019</a:t>
+              <a:t>8/28/2019</a:t>
             </a:fld>
             <a:endParaRPr lang="en-US"/>
           </a:p>
@@ -995,7 +995,7 @@
           <a:p>
             <a:fld id="{8CEE9158-D55C-48AF-AB8C-3C6514A907FE}" type="datetimeFigureOut">
               <a:rPr lang="en-US" smtClean="0"/>
-              <a:t>8/25/2019</a:t>
+              <a:t>8/28/2019</a:t>
             </a:fld>
             <a:endParaRPr lang="en-US"/>
           </a:p>
@@ -1202,7 +1202,7 @@
           <a:p>
             <a:fld id="{8CEE9158-D55C-48AF-AB8C-3C6514A907FE}" type="datetimeFigureOut">
               <a:rPr lang="en-US" smtClean="0"/>
-              <a:t>8/25/2019</a:t>
+              <a:t>8/28/2019</a:t>
             </a:fld>
             <a:endParaRPr lang="en-US"/>
           </a:p>
@@ -1452,7 +1452,7 @@
           <a:p>
             <a:fld id="{8CEE9158-D55C-48AF-AB8C-3C6514A907FE}" type="datetimeFigureOut">
               <a:rPr lang="en-US" smtClean="0"/>
-              <a:t>8/25/2019</a:t>
+              <a:t>8/28/2019</a:t>
             </a:fld>
             <a:endParaRPr lang="en-US"/>
           </a:p>
@@ -1752,7 +1752,7 @@
           <a:p>
             <a:fld id="{8CEE9158-D55C-48AF-AB8C-3C6514A907FE}" type="datetimeFigureOut">
               <a:rPr lang="en-US" smtClean="0"/>
-              <a:t>8/25/2019</a:t>
+              <a:t>8/28/2019</a:t>
             </a:fld>
             <a:endParaRPr lang="en-US"/>
           </a:p>
@@ -2193,7 +2193,7 @@
           <a:p>
             <a:fld id="{8CEE9158-D55C-48AF-AB8C-3C6514A907FE}" type="datetimeFigureOut">
               <a:rPr lang="en-US" smtClean="0"/>
-              <a:t>8/25/2019</a:t>
+              <a:t>8/28/2019</a:t>
             </a:fld>
             <a:endParaRPr lang="en-US"/>
           </a:p>
@@ -2317,7 +2317,7 @@
           <a:p>
             <a:fld id="{8CEE9158-D55C-48AF-AB8C-3C6514A907FE}" type="datetimeFigureOut">
               <a:rPr lang="en-US" smtClean="0"/>
-              <a:t>8/25/2019</a:t>
+              <a:t>8/28/2019</a:t>
             </a:fld>
             <a:endParaRPr lang="en-US"/>
           </a:p>
@@ -2412,7 +2412,7 @@
           <a:p>
             <a:fld id="{8CEE9158-D55C-48AF-AB8C-3C6514A907FE}" type="datetimeFigureOut">
               <a:rPr lang="en-US" smtClean="0"/>
-              <a:t>8/25/2019</a:t>
+              <a:t>8/28/2019</a:t>
             </a:fld>
             <a:endParaRPr lang="en-US"/>
           </a:p>
@@ -2709,7 +2709,7 @@
           <a:p>
             <a:fld id="{8CEE9158-D55C-48AF-AB8C-3C6514A907FE}" type="datetimeFigureOut">
               <a:rPr lang="en-US" smtClean="0"/>
-              <a:t>8/25/2019</a:t>
+              <a:t>8/28/2019</a:t>
             </a:fld>
             <a:endParaRPr lang="en-US"/>
           </a:p>
@@ -2967,7 +2967,7 @@
           <a:p>
             <a:fld id="{8CEE9158-D55C-48AF-AB8C-3C6514A907FE}" type="datetimeFigureOut">
               <a:rPr lang="en-US" smtClean="0"/>
-              <a:t>8/25/2019</a:t>
+              <a:t>8/28/2019</a:t>
             </a:fld>
             <a:endParaRPr lang="en-US"/>
           </a:p>
@@ -3706,7 +3706,7 @@
         </p:spPr>
         <p:txBody>
           <a:bodyPr>
-            <a:normAutofit fontScale="55000" lnSpcReduction="20000"/>
+            <a:normAutofit fontScale="47500" lnSpcReduction="20000"/>
           </a:bodyPr>
           <a:lstStyle/>
           <a:p>
@@ -3809,11 +3809,7 @@
             </a:pPr>
             <a:r>
               <a:rPr lang="en-US" dirty="0" smtClean="0"/>
-              <a:t>        </a:t>
-            </a:r>
-            <a:r>
-              <a:rPr lang="en-US" dirty="0" smtClean="0"/>
-              <a:t>while(</a:t>
+              <a:t>        while(</a:t>
             </a:r>
             <a:r>
               <a:rPr lang="en-US" dirty="0" err="1" smtClean="0"/>
@@ -3821,11 +3817,7 @@
             </a:r>
             <a:r>
               <a:rPr lang="en-US" dirty="0" smtClean="0"/>
-              <a:t> </a:t>
-            </a:r>
-            <a:r>
-              <a:rPr lang="en-US" dirty="0" smtClean="0"/>
-              <a:t>&gt; 0){</a:t>
+              <a:t> &gt; 0){</a:t>
             </a:r>
           </a:p>
           <a:p>
@@ -3860,11 +3852,11 @@
             </a:pPr>
             <a:r>
               <a:rPr lang="en-US" dirty="0" smtClean="0"/>
-              <a:t>                "One thing you've built that you're proud of</a:t>
-            </a:r>
-            <a:r>
-              <a:rPr lang="en-US" dirty="0" smtClean="0"/>
-              <a:t>",</a:t>
+              <a:t>                "One thing you've built that you're proud </a:t>
+            </a:r>
+            <a:r>
+              <a:rPr lang="en-US" dirty="0" smtClean="0"/>
+              <a:t>of“,</a:t>
             </a:r>
           </a:p>
           <a:p>
@@ -3877,11 +3869,15 @@
             </a:r>
             <a:r>
               <a:rPr lang="en-US" dirty="0" smtClean="0"/>
-              <a:t>           </a:t>
-            </a:r>
-            <a:r>
-              <a:rPr lang="en-US" dirty="0" smtClean="0"/>
-              <a:t>};</a:t>
+              <a:t>               “One reason you’re taking this class” </a:t>
+            </a:r>
+            <a:r>
+              <a:rPr lang="en-US" smtClean="0"/>
+              <a:t>// ASTUTE </a:t>
+            </a:r>
+            <a:r>
+              <a:rPr lang="en-US" dirty="0" smtClean="0"/>
+              <a:t>WIZARDS DO NOT SAY “BECAUSE IT’S REQUIRED”</a:t>
             </a:r>
             <a:endParaRPr lang="en-US" dirty="0" smtClean="0"/>
           </a:p>
@@ -3890,16 +3886,12 @@
               <a:buNone/>
             </a:pPr>
             <a:r>
-              <a:rPr lang="en-US" dirty="0" smtClean="0"/>
-              <a:t>        </a:t>
-            </a:r>
-            <a:r>
-              <a:rPr lang="en-US" dirty="0" smtClean="0"/>
-              <a:t>    Scanner </a:t>
-            </a:r>
-            <a:r>
-              <a:rPr lang="en-US" dirty="0" smtClean="0"/>
-              <a:t>response = new Scanner(System.in);</a:t>
+              <a:rPr lang="en-US" dirty="0"/>
+              <a:t> </a:t>
+            </a:r>
+            <a:r>
+              <a:rPr lang="en-US" dirty="0" smtClean="0"/>
+              <a:t>           };</a:t>
             </a:r>
           </a:p>
           <a:p>
@@ -3908,11 +3900,16 @@
             </a:pPr>
             <a:r>
               <a:rPr lang="en-US" dirty="0" smtClean="0"/>
-              <a:t>        </a:t>
-            </a:r>
-            <a:r>
-              <a:rPr lang="en-US" dirty="0" smtClean="0"/>
-              <a:t>    for(String </a:t>
+              <a:t>            Scanner response = new Scanner(System.in);</a:t>
+            </a:r>
+          </a:p>
+          <a:p>
+            <a:pPr marL="0" indent="0">
+              <a:buNone/>
+            </a:pPr>
+            <a:r>
+              <a:rPr lang="en-US" dirty="0" smtClean="0"/>
+              <a:t>            for(String </a:t>
             </a:r>
             <a:r>
               <a:rPr lang="en-US" dirty="0" err="1" smtClean="0"/>
@@ -3937,11 +3934,7 @@
             </a:pPr>
             <a:r>
               <a:rPr lang="en-US" dirty="0" smtClean="0"/>
-              <a:t>            </a:t>
-            </a:r>
-            <a:r>
-              <a:rPr lang="en-US" dirty="0" smtClean="0"/>
-              <a:t>    </a:t>
+              <a:t>                </a:t>
             </a:r>
             <a:r>
               <a:rPr lang="en-US" dirty="0" err="1" smtClean="0"/>
@@ -3966,15 +3959,7 @@
             </a:pPr>
             <a:r>
               <a:rPr lang="en-US" dirty="0" smtClean="0"/>
-              <a:t>            </a:t>
-            </a:r>
-            <a:r>
-              <a:rPr lang="en-US" dirty="0" smtClean="0"/>
-              <a:t>    String </a:t>
-            </a:r>
-            <a:r>
-              <a:rPr lang="en-US" dirty="0" smtClean="0"/>
-              <a:t>answer = </a:t>
+              <a:t>                String answer = </a:t>
             </a:r>
             <a:r>
               <a:rPr lang="en-US" dirty="0" err="1" smtClean="0"/>
@@ -3991,13 +3976,8 @@
             </a:pPr>
             <a:r>
               <a:rPr lang="en-US" dirty="0" smtClean="0"/>
-              <a:t>        </a:t>
-            </a:r>
-            <a:r>
-              <a:rPr lang="en-US" dirty="0" smtClean="0"/>
-              <a:t>    }</a:t>
-            </a:r>
-            <a:endParaRPr lang="en-US" dirty="0" smtClean="0"/>
+              <a:t>            }</a:t>
+            </a:r>
           </a:p>
           <a:p>
             <a:pPr marL="0" indent="0">
@@ -4005,11 +3985,7 @@
             </a:pPr>
             <a:r>
               <a:rPr lang="en-US" dirty="0" smtClean="0"/>
-              <a:t>        </a:t>
-            </a:r>
-            <a:r>
-              <a:rPr lang="en-US" dirty="0" smtClean="0"/>
-              <a:t>    </a:t>
+              <a:t>            </a:t>
             </a:r>
             <a:r>
               <a:rPr lang="en-US" dirty="0" err="1" smtClean="0"/>
@@ -4017,11 +3993,7 @@
             </a:r>
             <a:r>
               <a:rPr lang="en-US" dirty="0" smtClean="0"/>
-              <a:t>-</a:t>
-            </a:r>
-            <a:r>
-              <a:rPr lang="en-US" dirty="0" smtClean="0"/>
-              <a:t>-;</a:t>
+              <a:t>--;</a:t>
             </a:r>
           </a:p>
           <a:p>
@@ -4030,13 +4002,8 @@
             </a:pPr>
             <a:r>
               <a:rPr lang="en-US" dirty="0" smtClean="0"/>
-              <a:t>    </a:t>
-            </a:r>
-            <a:r>
-              <a:rPr lang="en-US" dirty="0" smtClean="0"/>
-              <a:t>    }</a:t>
-            </a:r>
-            <a:endParaRPr lang="en-US" dirty="0" smtClean="0"/>
+              <a:t>        }</a:t>
+            </a:r>
           </a:p>
           <a:p>
             <a:pPr marL="0" indent="0">
@@ -4048,13 +4015,8 @@
             </a:r>
             <a:r>
               <a:rPr lang="en-US" dirty="0" smtClean="0"/>
-              <a:t>   </a:t>
-            </a:r>
-            <a:r>
-              <a:rPr lang="en-US" dirty="0" smtClean="0"/>
-              <a:t>}</a:t>
-            </a:r>
-            <a:endParaRPr lang="en-US" dirty="0" smtClean="0"/>
+              <a:t>   }</a:t>
+            </a:r>
           </a:p>
           <a:p>
             <a:pPr marL="0" indent="0">

</xml_diff>